<commit_message>
Report and owl file updated
</commit_message>
<xml_diff>
--- a/Public Bike System Equiped by Semantic Web.pptx
+++ b/Public Bike System Equiped by Semantic Web.pptx
@@ -269,7 +269,7 @@
   </p:defaultTextStyle>
   <p:extLst>
     <p:ext uri="{EFAFB233-063F-42B5-8137-9DF3F51BA10A}">
-      <p15:sldGuideLst xmlns:p15="http://schemas.microsoft.com/office/powerpoint/2012/main" xmlns:p14="http://schemas.microsoft.com/office/powerpoint/2010/main" xmlns:com="http://schemas.openxmlformats.org/drawingml/2006/compatibility" xmlns:pvml="urn:schemas-microsoft-com:office:powerpoint" xmlns:v="urn:schemas-microsoft-com:vml" xmlns:o="urn:schemas-microsoft-com:office:office" xmlns:dgm="http://schemas.openxmlformats.org/drawingml/2006/diagram" xmlns:c="http://schemas.openxmlformats.org/drawingml/2006/chart" xmlns:mv="urn:schemas-microsoft-com:mac:vml" xmlns:mc="http://schemas.openxmlformats.org/markup-compatibility/2006" xmlns="">
+      <p15:sldGuideLst xmlns="" xmlns:mc="http://schemas.openxmlformats.org/markup-compatibility/2006" xmlns:mv="urn:schemas-microsoft-com:mac:vml" xmlns:c="http://schemas.openxmlformats.org/drawingml/2006/chart" xmlns:dgm="http://schemas.openxmlformats.org/drawingml/2006/diagram" xmlns:o="urn:schemas-microsoft-com:office:office" xmlns:v="urn:schemas-microsoft-com:vml" xmlns:pvml="urn:schemas-microsoft-com:office:powerpoint" xmlns:com="http://schemas.openxmlformats.org/drawingml/2006/compatibility" xmlns:p14="http://schemas.microsoft.com/office/powerpoint/2010/main" xmlns:p15="http://schemas.microsoft.com/office/powerpoint/2012/main">
         <p15:guide id="1" orient="horz" pos="1620">
           <p15:clr>
             <a:srgbClr val="A4A3A4"/>
@@ -1172,7 +1172,7 @@
         </p:nvSpPr>
         <p:spPr>
           <a:xfrm>
-            <a:off x="381300" y="685800"/>
+            <a:off x="381000" y="685800"/>
             <a:ext cx="6096000" cy="3429000"/>
           </a:xfrm>
           <a:custGeom>
@@ -8767,7 +8767,7 @@
               <a:buNone/>
             </a:pPr>
             <a:r>
-              <a:rPr lang="en" sz="1900"/>
+              <a:rPr lang="en" sz="1900" dirty="0"/>
               <a:t>Many kinds of open data have been published in web sites</a:t>
             </a:r>
             <a:endParaRPr sz="1900"/>
@@ -8784,7 +8784,7 @@
               <a:buChar char="➢"/>
             </a:pPr>
             <a:r>
-              <a:rPr lang="en" sz="1900"/>
+              <a:rPr lang="en" sz="1900" dirty="0"/>
               <a:t>Bicycle sharing stations</a:t>
             </a:r>
             <a:endParaRPr sz="1900"/>
@@ -8801,8 +8801,32 @@
               <a:buChar char="➢"/>
             </a:pPr>
             <a:r>
-              <a:rPr lang="en" sz="1900"/>
-              <a:t>Bus, tram, train and car system</a:t>
+              <a:rPr lang="en" sz="1900" dirty="0"/>
+              <a:t>Bus, tram, train and car </a:t>
+            </a:r>
+            <a:r>
+              <a:rPr lang="en" sz="1900" dirty="0" smtClean="0"/>
+              <a:t>system</a:t>
+            </a:r>
+          </a:p>
+          <a:p>
+            <a:pPr marL="914400" lvl="1" indent="-349250" algn="l" rtl="0">
+              <a:spcBef>
+                <a:spcPts val="0"/>
+              </a:spcBef>
+              <a:spcAft>
+                <a:spcPts val="0"/>
+              </a:spcAft>
+              <a:buSzPts val="1900"/>
+              <a:buChar char="➢"/>
+            </a:pPr>
+            <a:r>
+              <a:rPr lang="en-GB" sz="1900" dirty="0" smtClean="0"/>
+              <a:t>W</a:t>
+            </a:r>
+            <a:r>
+              <a:rPr lang="en" sz="1900" dirty="0" smtClean="0"/>
+              <a:t>eather data</a:t>
             </a:r>
             <a:endParaRPr sz="1900"/>
           </a:p>
@@ -8817,7 +8841,7 @@
               <a:buNone/>
             </a:pPr>
             <a:r>
-              <a:rPr lang="en" sz="1900"/>
+              <a:rPr lang="en" sz="1900" dirty="0"/>
               <a:t>Problems:</a:t>
             </a:r>
             <a:endParaRPr sz="1900"/>
@@ -8834,10 +8858,10 @@
               <a:buChar char="❖"/>
             </a:pPr>
             <a:r>
-              <a:rPr lang="en" sz="1900"/>
+              <a:rPr lang="en" sz="1600" dirty="0"/>
               <a:t>Data published in specific websites: government’s website...</a:t>
             </a:r>
-            <a:endParaRPr sz="1900"/>
+            <a:endParaRPr sz="1600"/>
           </a:p>
           <a:p>
             <a:pPr marL="457200" lvl="0" indent="-349250" algn="l" rtl="0">
@@ -8851,10 +8875,10 @@
               <a:buChar char="❖"/>
             </a:pPr>
             <a:r>
-              <a:rPr lang="en" sz="1900"/>
+              <a:rPr lang="en" sz="1600" dirty="0"/>
               <a:t>Not use same format for the data</a:t>
             </a:r>
-            <a:endParaRPr sz="1900"/>
+            <a:endParaRPr sz="1600"/>
           </a:p>
           <a:p>
             <a:pPr marL="457200" lvl="0" indent="-349250" algn="l" rtl="0">
@@ -8868,10 +8892,10 @@
               <a:buChar char="❖"/>
             </a:pPr>
             <a:r>
-              <a:rPr lang="en" sz="1900"/>
+              <a:rPr lang="en" sz="1600" dirty="0"/>
               <a:t>An integrated public bicycle sharing system is need in many domains: Travel, Work, Joy...</a:t>
             </a:r>
-            <a:endParaRPr sz="1900"/>
+            <a:endParaRPr sz="1600"/>
           </a:p>
         </p:txBody>
       </p:sp>

</xml_diff>